<commit_message>
updated powerpoint with screenshots
</commit_message>
<xml_diff>
--- a/FIFA Presentation.pptx
+++ b/FIFA Presentation.pptx
@@ -17,16 +17,18 @@
     <p:sldId id="262" r:id="rId12"/>
     <p:sldId id="263" r:id="rId13"/>
     <p:sldId id="264" r:id="rId14"/>
+    <p:sldId id="265" r:id="rId15"/>
+    <p:sldId id="266" r:id="rId16"/>
   </p:sldIdLst>
   <p:sldSz cy="5143500" cx="9144000"/>
   <p:notesSz cx="6858000" cy="9144000"/>
   <p:embeddedFontLst>
     <p:embeddedFont>
       <p:font typeface="Roboto"/>
-      <p:regular r:id="rId15"/>
-      <p:bold r:id="rId16"/>
-      <p:italic r:id="rId17"/>
-      <p:boldItalic r:id="rId18"/>
+      <p:regular r:id="rId17"/>
+      <p:bold r:id="rId18"/>
+      <p:italic r:id="rId19"/>
+      <p:boldItalic r:id="rId20"/>
     </p:embeddedFont>
   </p:embeddedFontLst>
   <p:defaultTextStyle>
@@ -802,6 +804,205 @@
 </p:notes>
 </file>
 
+<file path=ppt/notesSlides/notesSlide10.xml><?xml version="1.0" encoding="utf-8"?>
+<p:notes xmlns:a="http://schemas.openxmlformats.org/drawingml/2006/main" xmlns:r="http://schemas.openxmlformats.org/officeDocument/2006/relationships" xmlns:mc="http://schemas.openxmlformats.org/markup-compatibility/2006" xmlns:mv="urn:schemas-microsoft-com:mac:vml" xmlns:p="http://schemas.openxmlformats.org/presentationml/2006/main" xmlns:c="http://schemas.openxmlformats.org/drawingml/2006/chart" xmlns:dgm="http://schemas.openxmlformats.org/drawingml/2006/diagram" xmlns:o="urn:schemas-microsoft-com:office:office" xmlns:v="urn:schemas-microsoft-com:vml" xmlns:pvml="urn:schemas-microsoft-com:office:powerpoint" xmlns:com="http://schemas.openxmlformats.org/drawingml/2006/compatibility" xmlns:p14="http://schemas.microsoft.com/office/powerpoint/2010/main" xmlns:p15="http://schemas.microsoft.com/office/powerpoint/2012/main" xmlns:ahyp="http://schemas.microsoft.com/office/drawing/2018/hyperlinkcolor" showMasterPhAnim="0" showMasterSp="0">
+  <p:cSld>
+    <p:spTree>
+      <p:nvGrpSpPr>
+        <p:cNvPr id="135" name="Shape 135"/>
+        <p:cNvGrpSpPr/>
+        <p:nvPr/>
+      </p:nvGrpSpPr>
+      <p:grpSpPr>
+        <a:xfrm>
+          <a:off x="0" y="0"/>
+          <a:ext cx="0" cy="0"/>
+          <a:chOff x="0" y="0"/>
+          <a:chExt cx="0" cy="0"/>
+        </a:xfrm>
+      </p:grpSpPr>
+      <p:sp>
+        <p:nvSpPr>
+          <p:cNvPr id="136" name="Google Shape;136;g2b1c03363ba_0_110:notes"/>
+          <p:cNvSpPr/>
+          <p:nvPr>
+            <p:ph idx="2" type="sldImg"/>
+          </p:nvPr>
+        </p:nvSpPr>
+        <p:spPr>
+          <a:xfrm>
+            <a:off x="381300" y="685800"/>
+            <a:ext cx="6096000" cy="3429000"/>
+          </a:xfrm>
+          <a:custGeom>
+            <a:rect b="b" l="l" r="r" t="t"/>
+            <a:pathLst>
+              <a:path extrusionOk="0" h="120000" w="120000">
+                <a:moveTo>
+                  <a:pt x="0" y="0"/>
+                </a:moveTo>
+                <a:lnTo>
+                  <a:pt x="120000" y="0"/>
+                </a:lnTo>
+                <a:lnTo>
+                  <a:pt x="120000" y="120000"/>
+                </a:lnTo>
+                <a:lnTo>
+                  <a:pt x="0" y="120000"/>
+                </a:lnTo>
+                <a:close/>
+              </a:path>
+            </a:pathLst>
+          </a:custGeom>
+        </p:spPr>
+      </p:sp>
+      <p:sp>
+        <p:nvSpPr>
+          <p:cNvPr id="137" name="Google Shape;137;g2b1c03363ba_0_110:notes"/>
+          <p:cNvSpPr txBox="1"/>
+          <p:nvPr>
+            <p:ph idx="1" type="body"/>
+          </p:nvPr>
+        </p:nvSpPr>
+        <p:spPr>
+          <a:xfrm>
+            <a:off x="685800" y="4343400"/>
+            <a:ext cx="5486400" cy="4114800"/>
+          </a:xfrm>
+          <a:prstGeom prst="rect">
+            <a:avLst/>
+          </a:prstGeom>
+        </p:spPr>
+        <p:txBody>
+          <a:bodyPr anchorCtr="0" anchor="t" bIns="91425" lIns="91425" spcFirstLastPara="1" rIns="91425" wrap="square" tIns="91425">
+            <a:noAutofit/>
+          </a:bodyPr>
+          <a:lstStyle/>
+          <a:p>
+            <a:pPr indent="0" lvl="0" marL="0" rtl="0" algn="l">
+              <a:spcBef>
+                <a:spcPts val="0"/>
+              </a:spcBef>
+              <a:spcAft>
+                <a:spcPts val="0"/>
+              </a:spcAft>
+              <a:buNone/>
+            </a:pPr>
+            <a:r>
+              <a:rPr lang="en"/>
+              <a:t>Insert photo of exported data check.</a:t>
+            </a:r>
+            <a:endParaRPr/>
+          </a:p>
+        </p:txBody>
+      </p:sp>
+    </p:spTree>
+  </p:cSld>
+  <p:clrMapOvr>
+    <a:masterClrMapping/>
+  </p:clrMapOvr>
+</p:notes>
+</file>
+
+<file path=ppt/notesSlides/notesSlide11.xml><?xml version="1.0" encoding="utf-8"?>
+<p:notes xmlns:a="http://schemas.openxmlformats.org/drawingml/2006/main" xmlns:r="http://schemas.openxmlformats.org/officeDocument/2006/relationships" xmlns:mc="http://schemas.openxmlformats.org/markup-compatibility/2006" xmlns:mv="urn:schemas-microsoft-com:mac:vml" xmlns:p="http://schemas.openxmlformats.org/presentationml/2006/main" xmlns:c="http://schemas.openxmlformats.org/drawingml/2006/chart" xmlns:dgm="http://schemas.openxmlformats.org/drawingml/2006/diagram" xmlns:o="urn:schemas-microsoft-com:office:office" xmlns:v="urn:schemas-microsoft-com:vml" xmlns:pvml="urn:schemas-microsoft-com:office:powerpoint" xmlns:com="http://schemas.openxmlformats.org/drawingml/2006/compatibility" xmlns:p14="http://schemas.microsoft.com/office/powerpoint/2010/main" xmlns:p15="http://schemas.microsoft.com/office/powerpoint/2012/main" xmlns:ahyp="http://schemas.microsoft.com/office/drawing/2018/hyperlinkcolor" showMasterPhAnim="0" showMasterSp="0">
+  <p:cSld>
+    <p:spTree>
+      <p:nvGrpSpPr>
+        <p:cNvPr id="141" name="Shape 141"/>
+        <p:cNvGrpSpPr/>
+        <p:nvPr/>
+      </p:nvGrpSpPr>
+      <p:grpSpPr>
+        <a:xfrm>
+          <a:off x="0" y="0"/>
+          <a:ext cx="0" cy="0"/>
+          <a:chOff x="0" y="0"/>
+          <a:chExt cx="0" cy="0"/>
+        </a:xfrm>
+      </p:grpSpPr>
+      <p:sp>
+        <p:nvSpPr>
+          <p:cNvPr id="142" name="Google Shape;142;g2b1c03363ba_0_122:notes"/>
+          <p:cNvSpPr/>
+          <p:nvPr>
+            <p:ph idx="2" type="sldImg"/>
+          </p:nvPr>
+        </p:nvSpPr>
+        <p:spPr>
+          <a:xfrm>
+            <a:off x="381300" y="685800"/>
+            <a:ext cx="6096000" cy="3429000"/>
+          </a:xfrm>
+          <a:custGeom>
+            <a:rect b="b" l="l" r="r" t="t"/>
+            <a:pathLst>
+              <a:path extrusionOk="0" h="120000" w="120000">
+                <a:moveTo>
+                  <a:pt x="0" y="0"/>
+                </a:moveTo>
+                <a:lnTo>
+                  <a:pt x="120000" y="0"/>
+                </a:lnTo>
+                <a:lnTo>
+                  <a:pt x="120000" y="120000"/>
+                </a:lnTo>
+                <a:lnTo>
+                  <a:pt x="0" y="120000"/>
+                </a:lnTo>
+                <a:close/>
+              </a:path>
+            </a:pathLst>
+          </a:custGeom>
+        </p:spPr>
+      </p:sp>
+      <p:sp>
+        <p:nvSpPr>
+          <p:cNvPr id="143" name="Google Shape;143;g2b1c03363ba_0_122:notes"/>
+          <p:cNvSpPr txBox="1"/>
+          <p:nvPr>
+            <p:ph idx="1" type="body"/>
+          </p:nvPr>
+        </p:nvSpPr>
+        <p:spPr>
+          <a:xfrm>
+            <a:off x="685800" y="4343400"/>
+            <a:ext cx="5486400" cy="4114800"/>
+          </a:xfrm>
+          <a:prstGeom prst="rect">
+            <a:avLst/>
+          </a:prstGeom>
+        </p:spPr>
+        <p:txBody>
+          <a:bodyPr anchorCtr="0" anchor="t" bIns="91425" lIns="91425" spcFirstLastPara="1" rIns="91425" wrap="square" tIns="91425">
+            <a:noAutofit/>
+          </a:bodyPr>
+          <a:lstStyle/>
+          <a:p>
+            <a:pPr indent="0" lvl="0" marL="0" rtl="0" algn="l">
+              <a:spcBef>
+                <a:spcPts val="0"/>
+              </a:spcBef>
+              <a:spcAft>
+                <a:spcPts val="0"/>
+              </a:spcAft>
+              <a:buNone/>
+            </a:pPr>
+            <a:r>
+              <a:t/>
+            </a:r>
+            <a:endParaRPr/>
+          </a:p>
+        </p:txBody>
+      </p:sp>
+    </p:spTree>
+  </p:cSld>
+  <p:clrMapOvr>
+    <a:masterClrMapping/>
+  </p:clrMapOvr>
+</p:notes>
+</file>
+
 <file path=ppt/notesSlides/notesSlide2.xml><?xml version="1.0" encoding="utf-8"?>
 <p:notes xmlns:a="http://schemas.openxmlformats.org/drawingml/2006/main" xmlns:r="http://schemas.openxmlformats.org/officeDocument/2006/relationships" xmlns:mc="http://schemas.openxmlformats.org/markup-compatibility/2006" xmlns:mv="urn:schemas-microsoft-com:mac:vml" xmlns:p="http://schemas.openxmlformats.org/presentationml/2006/main" xmlns:c="http://schemas.openxmlformats.org/drawingml/2006/chart" xmlns:dgm="http://schemas.openxmlformats.org/drawingml/2006/diagram" xmlns:o="urn:schemas-microsoft-com:office:office" xmlns:v="urn:schemas-microsoft-com:vml" xmlns:pvml="urn:schemas-microsoft-com:office:powerpoint" xmlns:com="http://schemas.openxmlformats.org/drawingml/2006/compatibility" xmlns:p14="http://schemas.microsoft.com/office/powerpoint/2010/main" xmlns:p15="http://schemas.microsoft.com/office/powerpoint/2012/main" xmlns:ahyp="http://schemas.microsoft.com/office/drawing/2018/hyperlinkcolor" showMasterPhAnim="0" showMasterSp="0">
   <p:cSld>
@@ -1075,17 +1276,69 @@
           </a:bodyPr>
           <a:lstStyle/>
           <a:p>
-            <a:pPr indent="0" lvl="0" marL="0" rtl="0" algn="l">
-              <a:spcBef>
-                <a:spcPts val="0"/>
-              </a:spcBef>
-              <a:spcAft>
-                <a:spcPts val="0"/>
-              </a:spcAft>
-              <a:buNone/>
+            <a:pPr indent="-298450" lvl="0" marL="457200" rtl="0" algn="l">
+              <a:spcBef>
+                <a:spcPts val="0"/>
+              </a:spcBef>
+              <a:spcAft>
+                <a:spcPts val="0"/>
+              </a:spcAft>
+              <a:buSzPts val="1100"/>
+              <a:buChar char="-"/>
             </a:pPr>
             <a:r>
-              <a:t/>
+              <a:rPr lang="en"/>
+              <a:t>Can speak about why we chose the Kaggle datasets.</a:t>
+            </a:r>
+            <a:endParaRPr/>
+          </a:p>
+          <a:p>
+            <a:pPr indent="-298450" lvl="0" marL="457200" rtl="0" algn="l">
+              <a:spcBef>
+                <a:spcPts val="0"/>
+              </a:spcBef>
+              <a:spcAft>
+                <a:spcPts val="0"/>
+              </a:spcAft>
+              <a:buSzPts val="1100"/>
+              <a:buChar char="-"/>
+            </a:pPr>
+            <a:r>
+              <a:rPr lang="en"/>
+              <a:t>Why we chose to clean the data in the juypter notebook/python and use pandas/polars.</a:t>
+            </a:r>
+            <a:endParaRPr/>
+          </a:p>
+          <a:p>
+            <a:pPr indent="-298450" lvl="0" marL="457200" rtl="0" algn="l">
+              <a:spcBef>
+                <a:spcPts val="0"/>
+              </a:spcBef>
+              <a:spcAft>
+                <a:spcPts val="0"/>
+              </a:spcAft>
+              <a:buSzPts val="1100"/>
+              <a:buChar char="-"/>
+            </a:pPr>
+            <a:r>
+              <a:rPr lang="en"/>
+              <a:t>Why we opted for a SQL database and not a NoSQL database (we had a more structured dataset to work with which worked better with a SQL database, and we </a:t>
+            </a:r>
+            <a:r>
+              <a:rPr lang="en"/>
+              <a:t>wanted</a:t>
+            </a:r>
+            <a:r>
+              <a:rPr lang="en"/>
+              <a:t> to then use tables to </a:t>
+            </a:r>
+            <a:r>
+              <a:rPr lang="en"/>
+              <a:t>manipulate</a:t>
+            </a:r>
+            <a:r>
+              <a:rPr lang="en"/>
+              <a:t> the data to see trends and that would be better suited in a SQL database)</a:t>
             </a:r>
             <a:endParaRPr/>
           </a:p>
@@ -1185,7 +1438,7 @@
             </a:pPr>
             <a:r>
               <a:rPr lang="en"/>
-              <a:t>Insert photos of cleaning data from csv file</a:t>
+              <a:t>Insert photos of cleaning data from csv file - Nelson’s screenshot </a:t>
             </a:r>
             <a:endParaRPr/>
           </a:p>
@@ -1304,7 +1557,7 @@
   <p:cSld>
     <p:spTree>
       <p:nvGrpSpPr>
-        <p:cNvPr id="117" name="Shape 117"/>
+        <p:cNvPr id="118" name="Shape 118"/>
         <p:cNvGrpSpPr/>
         <p:nvPr/>
       </p:nvGrpSpPr>
@@ -1318,7 +1571,7 @@
       </p:grpSpPr>
       <p:sp>
         <p:nvSpPr>
-          <p:cNvPr id="118" name="Google Shape;118;g2b1c03363ba_0_102:notes"/>
+          <p:cNvPr id="119" name="Google Shape;119;g2b1c03363ba_0_117:notes"/>
           <p:cNvSpPr/>
           <p:nvPr>
             <p:ph idx="2" type="sldImg"/>
@@ -1353,7 +1606,7 @@
       </p:sp>
       <p:sp>
         <p:nvSpPr>
-          <p:cNvPr id="119" name="Google Shape;119;g2b1c03363ba_0_102:notes"/>
+          <p:cNvPr id="120" name="Google Shape;120;g2b1c03363ba_0_117:notes"/>
           <p:cNvSpPr txBox="1"/>
           <p:nvPr>
             <p:ph idx="1" type="body"/>
@@ -1384,8 +1637,7 @@
               <a:buNone/>
             </a:pPr>
             <a:r>
-              <a:rPr lang="en"/>
-              <a:t>Insert photo of ERD diagram </a:t>
+              <a:t/>
             </a:r>
             <a:endParaRPr/>
           </a:p>
@@ -1404,7 +1656,7 @@
   <p:cSld>
     <p:spTree>
       <p:nvGrpSpPr>
-        <p:cNvPr id="122" name="Shape 122"/>
+        <p:cNvPr id="124" name="Shape 124"/>
         <p:cNvGrpSpPr/>
         <p:nvPr/>
       </p:nvGrpSpPr>
@@ -1418,7 +1670,7 @@
       </p:grpSpPr>
       <p:sp>
         <p:nvSpPr>
-          <p:cNvPr id="123" name="Google Shape;123;g2b1c03363ba_0_106:notes"/>
+          <p:cNvPr id="125" name="Google Shape;125;g2b1c03363ba_0_102:notes"/>
           <p:cNvSpPr/>
           <p:nvPr>
             <p:ph idx="2" type="sldImg"/>
@@ -1453,7 +1705,7 @@
       </p:sp>
       <p:sp>
         <p:nvSpPr>
-          <p:cNvPr id="124" name="Google Shape;124;g2b1c03363ba_0_106:notes"/>
+          <p:cNvPr id="126" name="Google Shape;126;g2b1c03363ba_0_102:notes"/>
           <p:cNvSpPr txBox="1"/>
           <p:nvPr>
             <p:ph idx="1" type="body"/>
@@ -1485,7 +1737,7 @@
             </a:pPr>
             <a:r>
               <a:rPr lang="en"/>
-              <a:t>Insert photo of SQL database/tables</a:t>
+              <a:t>Insert photo of ERD diagram - need updated ERD</a:t>
             </a:r>
             <a:endParaRPr/>
           </a:p>
@@ -1504,7 +1756,7 @@
   <p:cSld>
     <p:spTree>
       <p:nvGrpSpPr>
-        <p:cNvPr id="128" name="Shape 128"/>
+        <p:cNvPr id="129" name="Shape 129"/>
         <p:cNvGrpSpPr/>
         <p:nvPr/>
       </p:nvGrpSpPr>
@@ -1518,7 +1770,7 @@
       </p:grpSpPr>
       <p:sp>
         <p:nvSpPr>
-          <p:cNvPr id="129" name="Google Shape;129;g2b1c03363ba_0_110:notes"/>
+          <p:cNvPr id="130" name="Google Shape;130;g2b1c03363ba_0_106:notes"/>
           <p:cNvSpPr/>
           <p:nvPr>
             <p:ph idx="2" type="sldImg"/>
@@ -1553,7 +1805,7 @@
       </p:sp>
       <p:sp>
         <p:nvSpPr>
-          <p:cNvPr id="130" name="Google Shape;130;g2b1c03363ba_0_110:notes"/>
+          <p:cNvPr id="131" name="Google Shape;131;g2b1c03363ba_0_106:notes"/>
           <p:cNvSpPr txBox="1"/>
           <p:nvPr>
             <p:ph idx="1" type="body"/>
@@ -1585,7 +1837,7 @@
             </a:pPr>
             <a:r>
               <a:rPr lang="en"/>
-              <a:t>Insert photo of exported data check.</a:t>
+              <a:t>Insert photo of SQL database/tables</a:t>
             </a:r>
             <a:endParaRPr/>
           </a:p>
@@ -8417,6 +8669,203 @@
 </p:sld>
 </file>
 
+<file path=ppt/slides/slide10.xml><?xml version="1.0" encoding="utf-8"?>
+<p:sld xmlns:a="http://schemas.openxmlformats.org/drawingml/2006/main" xmlns:r="http://schemas.openxmlformats.org/officeDocument/2006/relationships" xmlns:mc="http://schemas.openxmlformats.org/markup-compatibility/2006" xmlns:mv="urn:schemas-microsoft-com:mac:vml" xmlns:p="http://schemas.openxmlformats.org/presentationml/2006/main" xmlns:c="http://schemas.openxmlformats.org/drawingml/2006/chart" xmlns:dgm="http://schemas.openxmlformats.org/drawingml/2006/diagram" xmlns:o="urn:schemas-microsoft-com:office:office" xmlns:v="urn:schemas-microsoft-com:vml" xmlns:pvml="urn:schemas-microsoft-com:office:powerpoint" xmlns:com="http://schemas.openxmlformats.org/drawingml/2006/compatibility" xmlns:p14="http://schemas.microsoft.com/office/powerpoint/2010/main" xmlns:p15="http://schemas.microsoft.com/office/powerpoint/2012/main" xmlns:ahyp="http://schemas.microsoft.com/office/drawing/2018/hyperlinkcolor">
+  <p:cSld>
+    <p:spTree>
+      <p:nvGrpSpPr>
+        <p:cNvPr id="138" name="Shape 138"/>
+        <p:cNvGrpSpPr/>
+        <p:nvPr/>
+      </p:nvGrpSpPr>
+      <p:grpSpPr>
+        <a:xfrm>
+          <a:off x="0" y="0"/>
+          <a:ext cx="0" cy="0"/>
+          <a:chOff x="0" y="0"/>
+          <a:chExt cx="0" cy="0"/>
+        </a:xfrm>
+      </p:grpSpPr>
+      <p:sp>
+        <p:nvSpPr>
+          <p:cNvPr id="139" name="Google Shape;139;p22"/>
+          <p:cNvSpPr txBox="1"/>
+          <p:nvPr>
+            <p:ph idx="1" type="body"/>
+          </p:nvPr>
+        </p:nvSpPr>
+        <p:spPr>
+          <a:xfrm>
+            <a:off x="319500" y="4230575"/>
+            <a:ext cx="5998800" cy="598800"/>
+          </a:xfrm>
+          <a:prstGeom prst="rect">
+            <a:avLst/>
+          </a:prstGeom>
+        </p:spPr>
+        <p:txBody>
+          <a:bodyPr anchorCtr="0" anchor="ctr" bIns="91425" lIns="91425" spcFirstLastPara="1" rIns="91425" wrap="square" tIns="91425">
+            <a:normAutofit/>
+          </a:bodyPr>
+          <a:lstStyle/>
+          <a:p>
+            <a:pPr indent="0" lvl="0" marL="0" rtl="0" algn="l">
+              <a:spcBef>
+                <a:spcPts val="0"/>
+              </a:spcBef>
+              <a:spcAft>
+                <a:spcPts val="0"/>
+              </a:spcAft>
+              <a:buNone/>
+            </a:pPr>
+            <a:r>
+              <a:rPr lang="en"/>
+              <a:t>Exported Data:</a:t>
+            </a:r>
+            <a:endParaRPr/>
+          </a:p>
+        </p:txBody>
+      </p:sp>
+      <p:pic>
+        <p:nvPicPr>
+          <p:cNvPr id="140" name="Google Shape;140;p22"/>
+          <p:cNvPicPr preferRelativeResize="0"/>
+          <p:nvPr/>
+        </p:nvPicPr>
+        <p:blipFill>
+          <a:blip r:embed="rId3">
+            <a:alphaModFix/>
+          </a:blip>
+          <a:stretch>
+            <a:fillRect/>
+          </a:stretch>
+        </p:blipFill>
+        <p:spPr>
+          <a:xfrm>
+            <a:off x="152400" y="152400"/>
+            <a:ext cx="8319749" cy="4254474"/>
+          </a:xfrm>
+          <a:prstGeom prst="rect">
+            <a:avLst/>
+          </a:prstGeom>
+          <a:noFill/>
+          <a:ln>
+            <a:noFill/>
+          </a:ln>
+        </p:spPr>
+      </p:pic>
+    </p:spTree>
+  </p:cSld>
+  <p:clrMapOvr>
+    <a:masterClrMapping/>
+  </p:clrMapOvr>
+</p:sld>
+</file>
+
+<file path=ppt/slides/slide11.xml><?xml version="1.0" encoding="utf-8"?>
+<p:sld xmlns:a="http://schemas.openxmlformats.org/drawingml/2006/main" xmlns:r="http://schemas.openxmlformats.org/officeDocument/2006/relationships" xmlns:mc="http://schemas.openxmlformats.org/markup-compatibility/2006" xmlns:mv="urn:schemas-microsoft-com:mac:vml" xmlns:p="http://schemas.openxmlformats.org/presentationml/2006/main" xmlns:c="http://schemas.openxmlformats.org/drawingml/2006/chart" xmlns:dgm="http://schemas.openxmlformats.org/drawingml/2006/diagram" xmlns:o="urn:schemas-microsoft-com:office:office" xmlns:v="urn:schemas-microsoft-com:vml" xmlns:pvml="urn:schemas-microsoft-com:office:powerpoint" xmlns:com="http://schemas.openxmlformats.org/drawingml/2006/compatibility" xmlns:p14="http://schemas.microsoft.com/office/powerpoint/2010/main" xmlns:p15="http://schemas.microsoft.com/office/powerpoint/2012/main" xmlns:ahyp="http://schemas.microsoft.com/office/drawing/2018/hyperlinkcolor">
+  <p:cSld>
+    <p:spTree>
+      <p:nvGrpSpPr>
+        <p:cNvPr id="144" name="Shape 144"/>
+        <p:cNvGrpSpPr/>
+        <p:nvPr/>
+      </p:nvGrpSpPr>
+      <p:grpSpPr>
+        <a:xfrm>
+          <a:off x="0" y="0"/>
+          <a:ext cx="0" cy="0"/>
+          <a:chOff x="0" y="0"/>
+          <a:chExt cx="0" cy="0"/>
+        </a:xfrm>
+      </p:grpSpPr>
+      <p:sp>
+        <p:nvSpPr>
+          <p:cNvPr id="145" name="Google Shape;145;p23"/>
+          <p:cNvSpPr txBox="1"/>
+          <p:nvPr>
+            <p:ph idx="1" type="body"/>
+          </p:nvPr>
+        </p:nvSpPr>
+        <p:spPr>
+          <a:xfrm>
+            <a:off x="311700" y="3369225"/>
+            <a:ext cx="8520600" cy="1281900"/>
+          </a:xfrm>
+          <a:prstGeom prst="rect">
+            <a:avLst/>
+          </a:prstGeom>
+        </p:spPr>
+        <p:txBody>
+          <a:bodyPr anchorCtr="0" anchor="t" bIns="91425" lIns="91425" spcFirstLastPara="1" rIns="91425" wrap="square" tIns="91425">
+            <a:normAutofit/>
+          </a:bodyPr>
+          <a:lstStyle/>
+          <a:p>
+            <a:pPr indent="0" lvl="0" marL="0" rtl="0" algn="ctr">
+              <a:spcBef>
+                <a:spcPts val="0"/>
+              </a:spcBef>
+              <a:spcAft>
+                <a:spcPts val="1200"/>
+              </a:spcAft>
+              <a:buNone/>
+            </a:pPr>
+            <a:r>
+              <a:t/>
+            </a:r>
+            <a:endParaRPr/>
+          </a:p>
+        </p:txBody>
+      </p:sp>
+      <p:sp>
+        <p:nvSpPr>
+          <p:cNvPr id="146" name="Google Shape;146;p23"/>
+          <p:cNvSpPr txBox="1"/>
+          <p:nvPr>
+            <p:ph type="title"/>
+          </p:nvPr>
+        </p:nvSpPr>
+        <p:spPr>
+          <a:xfrm>
+            <a:off x="311700" y="1256050"/>
+            <a:ext cx="8520600" cy="2030700"/>
+          </a:xfrm>
+          <a:prstGeom prst="rect">
+            <a:avLst/>
+          </a:prstGeom>
+        </p:spPr>
+        <p:txBody>
+          <a:bodyPr anchorCtr="0" anchor="b" bIns="91425" lIns="91425" spcFirstLastPara="1" rIns="91425" wrap="square" tIns="91425">
+            <a:normAutofit/>
+          </a:bodyPr>
+          <a:lstStyle/>
+          <a:p>
+            <a:pPr indent="0" lvl="0" marL="0" rtl="0" algn="ctr">
+              <a:spcBef>
+                <a:spcPts val="0"/>
+              </a:spcBef>
+              <a:spcAft>
+                <a:spcPts val="0"/>
+              </a:spcAft>
+              <a:buNone/>
+            </a:pPr>
+            <a:r>
+              <a:rPr lang="en"/>
+              <a:t>Thank you</a:t>
+            </a:r>
+            <a:endParaRPr/>
+          </a:p>
+        </p:txBody>
+      </p:sp>
+    </p:spTree>
+  </p:cSld>
+  <p:clrMapOvr>
+    <a:masterClrMapping/>
+  </p:clrMapOvr>
+</p:sld>
+</file>
+
 <file path=ppt/slides/slide2.xml><?xml version="1.0" encoding="utf-8"?>
 <p:sld xmlns:a="http://schemas.openxmlformats.org/drawingml/2006/main" xmlns:r="http://schemas.openxmlformats.org/officeDocument/2006/relationships" xmlns:mc="http://schemas.openxmlformats.org/markup-compatibility/2006" xmlns:mv="urn:schemas-microsoft-com:mac:vml" xmlns:p="http://schemas.openxmlformats.org/presentationml/2006/main" xmlns:c="http://schemas.openxmlformats.org/drawingml/2006/chart" xmlns:dgm="http://schemas.openxmlformats.org/drawingml/2006/diagram" xmlns:o="urn:schemas-microsoft-com:office:office" xmlns:v="urn:schemas-microsoft-com:vml" xmlns:pvml="urn:schemas-microsoft-com:office:powerpoint" xmlns:com="http://schemas.openxmlformats.org/drawingml/2006/compatibility" xmlns:p14="http://schemas.microsoft.com/office/powerpoint/2010/main" xmlns:p15="http://schemas.microsoft.com/office/powerpoint/2012/main" xmlns:ahyp="http://schemas.microsoft.com/office/drawing/2018/hyperlinkcolor">
   <p:cSld>
@@ -9050,7 +9499,7 @@
         </p:nvSpPr>
         <p:spPr>
           <a:xfrm>
-            <a:off x="319500" y="4230575"/>
+            <a:off x="0" y="4544700"/>
             <a:ext cx="5998800" cy="598800"/>
           </a:xfrm>
           <a:prstGeom prst="rect">
@@ -9073,12 +9522,41 @@
               <a:buNone/>
             </a:pPr>
             <a:r>
-              <a:t/>
+              <a:rPr lang="en"/>
+              <a:t>Transformation of time</a:t>
             </a:r>
             <a:endParaRPr/>
           </a:p>
         </p:txBody>
       </p:sp>
+      <p:pic>
+        <p:nvPicPr>
+          <p:cNvPr id="117" name="Google Shape;117;p18"/>
+          <p:cNvPicPr preferRelativeResize="0"/>
+          <p:nvPr/>
+        </p:nvPicPr>
+        <p:blipFill>
+          <a:blip r:embed="rId3">
+            <a:alphaModFix/>
+          </a:blip>
+          <a:stretch>
+            <a:fillRect/>
+          </a:stretch>
+        </p:blipFill>
+        <p:spPr>
+          <a:xfrm>
+            <a:off x="148050" y="71175"/>
+            <a:ext cx="8324127" cy="4473524"/>
+          </a:xfrm>
+          <a:prstGeom prst="rect">
+            <a:avLst/>
+          </a:prstGeom>
+          <a:noFill/>
+          <a:ln>
+            <a:noFill/>
+          </a:ln>
+        </p:spPr>
+      </p:pic>
     </p:spTree>
   </p:cSld>
   <p:clrMapOvr>
@@ -9092,7 +9570,7 @@
   <p:cSld>
     <p:spTree>
       <p:nvGrpSpPr>
-        <p:cNvPr id="120" name="Shape 120"/>
+        <p:cNvPr id="121" name="Shape 121"/>
         <p:cNvGrpSpPr/>
         <p:nvPr/>
       </p:nvGrpSpPr>
@@ -9106,7 +9584,100 @@
       </p:grpSpPr>
       <p:sp>
         <p:nvSpPr>
-          <p:cNvPr id="121" name="Google Shape;121;p19"/>
+          <p:cNvPr id="122" name="Google Shape;122;p19"/>
+          <p:cNvSpPr txBox="1"/>
+          <p:nvPr>
+            <p:ph idx="1" type="body"/>
+          </p:nvPr>
+        </p:nvSpPr>
+        <p:spPr>
+          <a:xfrm>
+            <a:off x="0" y="4481075"/>
+            <a:ext cx="5998800" cy="598800"/>
+          </a:xfrm>
+          <a:prstGeom prst="rect">
+            <a:avLst/>
+          </a:prstGeom>
+        </p:spPr>
+        <p:txBody>
+          <a:bodyPr anchorCtr="0" anchor="ctr" bIns="91425" lIns="91425" spcFirstLastPara="1" rIns="91425" wrap="square" tIns="91425">
+            <a:normAutofit/>
+          </a:bodyPr>
+          <a:lstStyle/>
+          <a:p>
+            <a:pPr indent="0" lvl="0" marL="0" rtl="0" algn="l">
+              <a:spcBef>
+                <a:spcPts val="0"/>
+              </a:spcBef>
+              <a:spcAft>
+                <a:spcPts val="0"/>
+              </a:spcAft>
+              <a:buNone/>
+            </a:pPr>
+            <a:r>
+              <a:rPr lang="en"/>
+              <a:t>Polars DataFrame &amp; Dropping Columns</a:t>
+            </a:r>
+            <a:endParaRPr/>
+          </a:p>
+        </p:txBody>
+      </p:sp>
+      <p:pic>
+        <p:nvPicPr>
+          <p:cNvPr id="123" name="Google Shape;123;p19"/>
+          <p:cNvPicPr preferRelativeResize="0"/>
+          <p:nvPr/>
+        </p:nvPicPr>
+        <p:blipFill>
+          <a:blip r:embed="rId3">
+            <a:alphaModFix/>
+          </a:blip>
+          <a:stretch>
+            <a:fillRect/>
+          </a:stretch>
+        </p:blipFill>
+        <p:spPr>
+          <a:xfrm>
+            <a:off x="152400" y="152400"/>
+            <a:ext cx="8114775" cy="4544049"/>
+          </a:xfrm>
+          <a:prstGeom prst="rect">
+            <a:avLst/>
+          </a:prstGeom>
+          <a:noFill/>
+          <a:ln>
+            <a:noFill/>
+          </a:ln>
+        </p:spPr>
+      </p:pic>
+    </p:spTree>
+  </p:cSld>
+  <p:clrMapOvr>
+    <a:masterClrMapping/>
+  </p:clrMapOvr>
+</p:sld>
+</file>
+
+<file path=ppt/slides/slide8.xml><?xml version="1.0" encoding="utf-8"?>
+<p:sld xmlns:a="http://schemas.openxmlformats.org/drawingml/2006/main" xmlns:r="http://schemas.openxmlformats.org/officeDocument/2006/relationships" xmlns:mc="http://schemas.openxmlformats.org/markup-compatibility/2006" xmlns:mv="urn:schemas-microsoft-com:mac:vml" xmlns:p="http://schemas.openxmlformats.org/presentationml/2006/main" xmlns:c="http://schemas.openxmlformats.org/drawingml/2006/chart" xmlns:dgm="http://schemas.openxmlformats.org/drawingml/2006/diagram" xmlns:o="urn:schemas-microsoft-com:office:office" xmlns:v="urn:schemas-microsoft-com:vml" xmlns:pvml="urn:schemas-microsoft-com:office:powerpoint" xmlns:com="http://schemas.openxmlformats.org/drawingml/2006/compatibility" xmlns:p14="http://schemas.microsoft.com/office/powerpoint/2010/main" xmlns:p15="http://schemas.microsoft.com/office/powerpoint/2012/main" xmlns:ahyp="http://schemas.microsoft.com/office/drawing/2018/hyperlinkcolor">
+  <p:cSld>
+    <p:spTree>
+      <p:nvGrpSpPr>
+        <p:cNvPr id="127" name="Shape 127"/>
+        <p:cNvGrpSpPr/>
+        <p:nvPr/>
+      </p:nvGrpSpPr>
+      <p:grpSpPr>
+        <a:xfrm>
+          <a:off x="0" y="0"/>
+          <a:ext cx="0" cy="0"/>
+          <a:chOff x="0" y="0"/>
+          <a:chExt cx="0" cy="0"/>
+        </a:xfrm>
+      </p:grpSpPr>
+      <p:sp>
+        <p:nvSpPr>
+          <p:cNvPr id="128" name="Google Shape;128;p20"/>
           <p:cNvSpPr txBox="1"/>
           <p:nvPr>
             <p:ph idx="1" type="body"/>
@@ -9151,12 +9722,12 @@
 </p:sld>
 </file>
 
-<file path=ppt/slides/slide8.xml><?xml version="1.0" encoding="utf-8"?>
+<file path=ppt/slides/slide9.xml><?xml version="1.0" encoding="utf-8"?>
 <p:sld xmlns:a="http://schemas.openxmlformats.org/drawingml/2006/main" xmlns:r="http://schemas.openxmlformats.org/officeDocument/2006/relationships" xmlns:mc="http://schemas.openxmlformats.org/markup-compatibility/2006" xmlns:mv="urn:schemas-microsoft-com:mac:vml" xmlns:p="http://schemas.openxmlformats.org/presentationml/2006/main" xmlns:c="http://schemas.openxmlformats.org/drawingml/2006/chart" xmlns:dgm="http://schemas.openxmlformats.org/drawingml/2006/diagram" xmlns:o="urn:schemas-microsoft-com:office:office" xmlns:v="urn:schemas-microsoft-com:vml" xmlns:pvml="urn:schemas-microsoft-com:office:powerpoint" xmlns:com="http://schemas.openxmlformats.org/drawingml/2006/compatibility" xmlns:p14="http://schemas.microsoft.com/office/powerpoint/2010/main" xmlns:p15="http://schemas.microsoft.com/office/powerpoint/2012/main" xmlns:ahyp="http://schemas.microsoft.com/office/drawing/2018/hyperlinkcolor">
   <p:cSld>
     <p:spTree>
       <p:nvGrpSpPr>
-        <p:cNvPr id="125" name="Shape 125"/>
+        <p:cNvPr id="132" name="Shape 132"/>
         <p:cNvGrpSpPr/>
         <p:nvPr/>
       </p:nvGrpSpPr>
@@ -9170,7 +9741,7 @@
       </p:grpSpPr>
       <p:sp>
         <p:nvSpPr>
-          <p:cNvPr id="126" name="Google Shape;126;p20"/>
+          <p:cNvPr id="133" name="Google Shape;133;p21"/>
           <p:cNvSpPr txBox="1"/>
           <p:nvPr>
             <p:ph idx="1" type="body"/>
@@ -9210,7 +9781,7 @@
       </p:sp>
       <p:pic>
         <p:nvPicPr>
-          <p:cNvPr id="127" name="Google Shape;127;p20"/>
+          <p:cNvPr id="134" name="Google Shape;134;p21"/>
           <p:cNvPicPr preferRelativeResize="0"/>
           <p:nvPr/>
         </p:nvPicPr>
@@ -9226,99 +9797,6 @@
           <a:xfrm>
             <a:off x="152400" y="152400"/>
             <a:ext cx="6873714" cy="4153500"/>
-          </a:xfrm>
-          <a:prstGeom prst="rect">
-            <a:avLst/>
-          </a:prstGeom>
-          <a:noFill/>
-          <a:ln>
-            <a:noFill/>
-          </a:ln>
-        </p:spPr>
-      </p:pic>
-    </p:spTree>
-  </p:cSld>
-  <p:clrMapOvr>
-    <a:masterClrMapping/>
-  </p:clrMapOvr>
-</p:sld>
-</file>
-
-<file path=ppt/slides/slide9.xml><?xml version="1.0" encoding="utf-8"?>
-<p:sld xmlns:a="http://schemas.openxmlformats.org/drawingml/2006/main" xmlns:r="http://schemas.openxmlformats.org/officeDocument/2006/relationships" xmlns:mc="http://schemas.openxmlformats.org/markup-compatibility/2006" xmlns:mv="urn:schemas-microsoft-com:mac:vml" xmlns:p="http://schemas.openxmlformats.org/presentationml/2006/main" xmlns:c="http://schemas.openxmlformats.org/drawingml/2006/chart" xmlns:dgm="http://schemas.openxmlformats.org/drawingml/2006/diagram" xmlns:o="urn:schemas-microsoft-com:office:office" xmlns:v="urn:schemas-microsoft-com:vml" xmlns:pvml="urn:schemas-microsoft-com:office:powerpoint" xmlns:com="http://schemas.openxmlformats.org/drawingml/2006/compatibility" xmlns:p14="http://schemas.microsoft.com/office/powerpoint/2010/main" xmlns:p15="http://schemas.microsoft.com/office/powerpoint/2012/main" xmlns:ahyp="http://schemas.microsoft.com/office/drawing/2018/hyperlinkcolor">
-  <p:cSld>
-    <p:spTree>
-      <p:nvGrpSpPr>
-        <p:cNvPr id="131" name="Shape 131"/>
-        <p:cNvGrpSpPr/>
-        <p:nvPr/>
-      </p:nvGrpSpPr>
-      <p:grpSpPr>
-        <a:xfrm>
-          <a:off x="0" y="0"/>
-          <a:ext cx="0" cy="0"/>
-          <a:chOff x="0" y="0"/>
-          <a:chExt cx="0" cy="0"/>
-        </a:xfrm>
-      </p:grpSpPr>
-      <p:sp>
-        <p:nvSpPr>
-          <p:cNvPr id="132" name="Google Shape;132;p21"/>
-          <p:cNvSpPr txBox="1"/>
-          <p:nvPr>
-            <p:ph idx="1" type="body"/>
-          </p:nvPr>
-        </p:nvSpPr>
-        <p:spPr>
-          <a:xfrm>
-            <a:off x="319500" y="4230575"/>
-            <a:ext cx="5998800" cy="598800"/>
-          </a:xfrm>
-          <a:prstGeom prst="rect">
-            <a:avLst/>
-          </a:prstGeom>
-        </p:spPr>
-        <p:txBody>
-          <a:bodyPr anchorCtr="0" anchor="ctr" bIns="91425" lIns="91425" spcFirstLastPara="1" rIns="91425" wrap="square" tIns="91425">
-            <a:normAutofit/>
-          </a:bodyPr>
-          <a:lstStyle/>
-          <a:p>
-            <a:pPr indent="0" lvl="0" marL="0" rtl="0" algn="l">
-              <a:spcBef>
-                <a:spcPts val="0"/>
-              </a:spcBef>
-              <a:spcAft>
-                <a:spcPts val="0"/>
-              </a:spcAft>
-              <a:buNone/>
-            </a:pPr>
-            <a:r>
-              <a:rPr lang="en"/>
-              <a:t>Exported Data:</a:t>
-            </a:r>
-            <a:endParaRPr/>
-          </a:p>
-        </p:txBody>
-      </p:sp>
-      <p:pic>
-        <p:nvPicPr>
-          <p:cNvPr id="133" name="Google Shape;133;p21"/>
-          <p:cNvPicPr preferRelativeResize="0"/>
-          <p:nvPr/>
-        </p:nvPicPr>
-        <p:blipFill>
-          <a:blip r:embed="rId3">
-            <a:alphaModFix/>
-          </a:blip>
-          <a:stretch>
-            <a:fillRect/>
-          </a:stretch>
-        </p:blipFill>
-        <p:spPr>
-          <a:xfrm>
-            <a:off x="152400" y="152400"/>
-            <a:ext cx="8319749" cy="4254474"/>
           </a:xfrm>
           <a:prstGeom prst="rect">
             <a:avLst/>

</xml_diff>